<commit_message>
Update final project ppt.
</commit_message>
<xml_diff>
--- a/Documents/FP_2048.pptx
+++ b/Documents/FP_2048.pptx
@@ -837,7 +837,7 @@
           <a:p>
             <a:fld id="{127173F5-9AFA-4C75-91DD-7908B445EDD6}" type="datetimeFigureOut">
               <a:rPr lang="zh-TW" altLang="en-US" smtClean="0"/>
-              <a:t>2019/1/1</a:t>
+              <a:t>2019/1/8</a:t>
             </a:fld>
             <a:endParaRPr lang="zh-TW" altLang="en-US"/>
           </a:p>
@@ -1088,7 +1088,7 @@
           <a:p>
             <a:fld id="{127173F5-9AFA-4C75-91DD-7908B445EDD6}" type="datetimeFigureOut">
               <a:rPr lang="zh-TW" altLang="en-US" smtClean="0"/>
-              <a:t>2019/1/1</a:t>
+              <a:t>2019/1/8</a:t>
             </a:fld>
             <a:endParaRPr lang="zh-TW" altLang="en-US"/>
           </a:p>
@@ -1402,7 +1402,7 @@
           <a:p>
             <a:fld id="{127173F5-9AFA-4C75-91DD-7908B445EDD6}" type="datetimeFigureOut">
               <a:rPr lang="zh-TW" altLang="en-US" smtClean="0"/>
-              <a:t>2019/1/1</a:t>
+              <a:t>2019/1/8</a:t>
             </a:fld>
             <a:endParaRPr lang="zh-TW" altLang="en-US"/>
           </a:p>
@@ -1743,7 +1743,7 @@
           <a:p>
             <a:fld id="{127173F5-9AFA-4C75-91DD-7908B445EDD6}" type="datetimeFigureOut">
               <a:rPr lang="zh-TW" altLang="en-US" smtClean="0"/>
-              <a:t>2019/1/1</a:t>
+              <a:t>2019/1/8</a:t>
             </a:fld>
             <a:endParaRPr lang="zh-TW" altLang="en-US"/>
           </a:p>
@@ -2057,7 +2057,7 @@
           <a:p>
             <a:fld id="{127173F5-9AFA-4C75-91DD-7908B445EDD6}" type="datetimeFigureOut">
               <a:rPr lang="zh-TW" altLang="en-US" smtClean="0"/>
-              <a:t>2019/1/1</a:t>
+              <a:t>2019/1/8</a:t>
             </a:fld>
             <a:endParaRPr lang="zh-TW" altLang="en-US"/>
           </a:p>
@@ -2450,7 +2450,7 @@
           <a:p>
             <a:fld id="{127173F5-9AFA-4C75-91DD-7908B445EDD6}" type="datetimeFigureOut">
               <a:rPr lang="zh-TW" altLang="en-US" smtClean="0"/>
-              <a:t>2019/1/1</a:t>
+              <a:t>2019/1/8</a:t>
             </a:fld>
             <a:endParaRPr lang="zh-TW" altLang="en-US"/>
           </a:p>
@@ -2620,7 +2620,7 @@
           <a:p>
             <a:fld id="{127173F5-9AFA-4C75-91DD-7908B445EDD6}" type="datetimeFigureOut">
               <a:rPr lang="zh-TW" altLang="en-US" smtClean="0"/>
-              <a:t>2019/1/1</a:t>
+              <a:t>2019/1/8</a:t>
             </a:fld>
             <a:endParaRPr lang="zh-TW" altLang="en-US"/>
           </a:p>
@@ -2800,7 +2800,7 @@
           <a:p>
             <a:fld id="{127173F5-9AFA-4C75-91DD-7908B445EDD6}" type="datetimeFigureOut">
               <a:rPr lang="zh-TW" altLang="en-US" smtClean="0"/>
-              <a:t>2019/1/1</a:t>
+              <a:t>2019/1/8</a:t>
             </a:fld>
             <a:endParaRPr lang="zh-TW" altLang="en-US"/>
           </a:p>
@@ -2976,7 +2976,7 @@
           <a:p>
             <a:fld id="{127173F5-9AFA-4C75-91DD-7908B445EDD6}" type="datetimeFigureOut">
               <a:rPr lang="zh-TW" altLang="en-US" smtClean="0"/>
-              <a:t>2019/1/1</a:t>
+              <a:t>2019/1/8</a:t>
             </a:fld>
             <a:endParaRPr lang="zh-TW" altLang="en-US"/>
           </a:p>
@@ -3223,7 +3223,7 @@
           <a:p>
             <a:fld id="{127173F5-9AFA-4C75-91DD-7908B445EDD6}" type="datetimeFigureOut">
               <a:rPr lang="zh-TW" altLang="en-US" smtClean="0"/>
-              <a:t>2019/1/1</a:t>
+              <a:t>2019/1/8</a:t>
             </a:fld>
             <a:endParaRPr lang="zh-TW" altLang="en-US"/>
           </a:p>
@@ -3455,7 +3455,7 @@
           <a:p>
             <a:fld id="{127173F5-9AFA-4C75-91DD-7908B445EDD6}" type="datetimeFigureOut">
               <a:rPr lang="zh-TW" altLang="en-US" smtClean="0"/>
-              <a:t>2019/1/1</a:t>
+              <a:t>2019/1/8</a:t>
             </a:fld>
             <a:endParaRPr lang="zh-TW" altLang="en-US"/>
           </a:p>
@@ -3829,7 +3829,7 @@
           <a:p>
             <a:fld id="{127173F5-9AFA-4C75-91DD-7908B445EDD6}" type="datetimeFigureOut">
               <a:rPr lang="zh-TW" altLang="en-US" smtClean="0"/>
-              <a:t>2019/1/1</a:t>
+              <a:t>2019/1/8</a:t>
             </a:fld>
             <a:endParaRPr lang="zh-TW" altLang="en-US"/>
           </a:p>
@@ -3952,7 +3952,7 @@
           <a:p>
             <a:fld id="{127173F5-9AFA-4C75-91DD-7908B445EDD6}" type="datetimeFigureOut">
               <a:rPr lang="zh-TW" altLang="en-US" smtClean="0"/>
-              <a:t>2019/1/1</a:t>
+              <a:t>2019/1/8</a:t>
             </a:fld>
             <a:endParaRPr lang="zh-TW" altLang="en-US"/>
           </a:p>
@@ -4047,7 +4047,7 @@
           <a:p>
             <a:fld id="{127173F5-9AFA-4C75-91DD-7908B445EDD6}" type="datetimeFigureOut">
               <a:rPr lang="zh-TW" altLang="en-US" smtClean="0"/>
-              <a:t>2019/1/1</a:t>
+              <a:t>2019/1/8</a:t>
             </a:fld>
             <a:endParaRPr lang="zh-TW" altLang="en-US"/>
           </a:p>
@@ -4302,7 +4302,7 @@
           <a:p>
             <a:fld id="{127173F5-9AFA-4C75-91DD-7908B445EDD6}" type="datetimeFigureOut">
               <a:rPr lang="zh-TW" altLang="en-US" smtClean="0"/>
-              <a:t>2019/1/1</a:t>
+              <a:t>2019/1/8</a:t>
             </a:fld>
             <a:endParaRPr lang="zh-TW" altLang="en-US"/>
           </a:p>
@@ -4565,7 +4565,7 @@
           <a:p>
             <a:fld id="{127173F5-9AFA-4C75-91DD-7908B445EDD6}" type="datetimeFigureOut">
               <a:rPr lang="zh-TW" altLang="en-US" smtClean="0"/>
-              <a:t>2019/1/1</a:t>
+              <a:t>2019/1/8</a:t>
             </a:fld>
             <a:endParaRPr lang="zh-TW" altLang="en-US"/>
           </a:p>
@@ -5308,7 +5308,7 @@
           <a:p>
             <a:fld id="{127173F5-9AFA-4C75-91DD-7908B445EDD6}" type="datetimeFigureOut">
               <a:rPr lang="zh-TW" altLang="en-US" smtClean="0"/>
-              <a:t>2019/1/1</a:t>
+              <a:t>2019/1/8</a:t>
             </a:fld>
             <a:endParaRPr lang="zh-TW" altLang="en-US"/>
           </a:p>
@@ -5941,8 +5941,12 @@
           <a:lstStyle/>
           <a:p>
             <a:r>
-              <a:rPr lang="zh-TW" altLang="zh-TW" dirty="0"/>
-              <a:t>需求分析：</a:t>
+              <a:rPr lang="zh-TW" altLang="en-US" dirty="0"/>
+              <a:t>功能</a:t>
+            </a:r>
+            <a:r>
+              <a:rPr lang="zh-TW" altLang="zh-TW" dirty="0" smtClean="0"/>
+              <a:t>：</a:t>
             </a:r>
             <a:endParaRPr lang="zh-TW" altLang="en-US" dirty="0"/>
           </a:p>
@@ -5966,7 +5970,7 @@
         </p:spPr>
         <p:txBody>
           <a:bodyPr>
-            <a:normAutofit/>
+            <a:normAutofit lnSpcReduction="10000"/>
           </a:bodyPr>
           <a:lstStyle/>
           <a:p>
@@ -5976,13 +5980,10 @@
               </a:lnSpc>
             </a:pPr>
             <a:r>
-              <a:rPr lang="zh-TW" altLang="zh-TW" sz="2000" dirty="0" smtClean="0"/>
-              <a:t>顯示</a:t>
-            </a:r>
-            <a:r>
-              <a:rPr lang="zh-TW" altLang="zh-TW" sz="2000" dirty="0"/>
-              <a:t>當前得分</a:t>
-            </a:r>
+              <a:rPr lang="zh-TW" altLang="en-US" sz="2000" dirty="0" smtClean="0"/>
+              <a:t>雙人對戰</a:t>
+            </a:r>
+            <a:endParaRPr lang="en-US" altLang="zh-TW" sz="2000" dirty="0" smtClean="0"/>
           </a:p>
           <a:p>
             <a:pPr lvl="0">
@@ -5991,8 +5992,12 @@
               </a:lnSpc>
             </a:pPr>
             <a:r>
+              <a:rPr lang="zh-TW" altLang="zh-TW" sz="2000" dirty="0" smtClean="0"/>
+              <a:t>顯示</a:t>
+            </a:r>
+            <a:r>
               <a:rPr lang="zh-TW" altLang="zh-TW" sz="2000" dirty="0"/>
-              <a:t>顯示當前最高分</a:t>
+              <a:t>當前得分</a:t>
             </a:r>
           </a:p>
           <a:p>
@@ -6003,13 +6008,8 @@
             </a:pPr>
             <a:r>
               <a:rPr lang="zh-TW" altLang="zh-TW" sz="2000" dirty="0"/>
-              <a:t>顯示當前已運行</a:t>
-            </a:r>
-            <a:r>
-              <a:rPr lang="zh-TW" altLang="zh-TW" sz="2000" dirty="0" smtClean="0"/>
-              <a:t>時間</a:t>
-            </a:r>
-            <a:endParaRPr lang="zh-TW" altLang="zh-TW" sz="2000" dirty="0"/>
+              <a:t>顯示當前最高分</a:t>
+            </a:r>
           </a:p>
           <a:p>
             <a:pPr lvl="0">
@@ -6019,6 +6019,22 @@
             </a:pPr>
             <a:r>
               <a:rPr lang="zh-TW" altLang="zh-TW" sz="2000" dirty="0"/>
+              <a:t>顯示當前已運行</a:t>
+            </a:r>
+            <a:r>
+              <a:rPr lang="zh-TW" altLang="zh-TW" sz="2000" dirty="0" smtClean="0"/>
+              <a:t>時間</a:t>
+            </a:r>
+            <a:endParaRPr lang="zh-TW" altLang="zh-TW" sz="2000" dirty="0"/>
+          </a:p>
+          <a:p>
+            <a:pPr lvl="0">
+              <a:lnSpc>
+                <a:spcPct val="150000"/>
+              </a:lnSpc>
+            </a:pPr>
+            <a:r>
+              <a:rPr lang="zh-TW" altLang="zh-TW" sz="2000" dirty="0"/>
               <a:t>兩個按鍵</a:t>
             </a:r>
             <a:r>
@@ -6054,15 +6070,7 @@
             </a:pPr>
             <a:r>
               <a:rPr lang="zh-TW" altLang="en-US" sz="2000" dirty="0" smtClean="0"/>
-              <a:t>背景撥放</a:t>
-            </a:r>
-            <a:r>
-              <a:rPr lang="zh-TW" altLang="en-US" sz="2000" dirty="0" smtClean="0"/>
-              <a:t>音樂，隨分數</a:t>
-            </a:r>
-            <a:r>
-              <a:rPr lang="zh-TW" altLang="en-US" sz="2000" dirty="0" smtClean="0"/>
-              <a:t>增</a:t>
+              <a:t>背景撥放音樂，隨分數增</a:t>
             </a:r>
             <a:r>
               <a:rPr lang="zh-TW" altLang="en-US" sz="2000" dirty="0"/>
@@ -6081,7 +6089,7 @@
               </a:lnSpc>
             </a:pPr>
             <a:r>
-              <a:rPr lang="zh-TW" altLang="en-US" sz="2000" dirty="0"/>
+              <a:rPr lang="zh-TW" altLang="en-US" sz="2000" dirty="0" smtClean="0"/>
               <a:t>按下一個按鍵會隨機</a:t>
             </a:r>
             <a:r>
@@ -6106,11 +6114,7 @@
             </a:r>
             <a:r>
               <a:rPr lang="zh-TW" altLang="en-US" sz="2000" dirty="0" smtClean="0"/>
-              <a:t>自動</a:t>
-            </a:r>
-            <a:r>
-              <a:rPr lang="zh-TW" altLang="en-US" sz="2000" dirty="0" smtClean="0"/>
-              <a:t>玩遊戲</a:t>
+              <a:t>自動玩遊戲</a:t>
             </a:r>
             <a:endParaRPr lang="en-US" altLang="zh-TW" sz="2000" dirty="0" smtClean="0"/>
           </a:p>
@@ -7153,42 +7157,6 @@
       </p:cxnSp>
       <p:cxnSp>
         <p:nvCxnSpPr>
-          <p:cNvPr id="44" name="直線單箭頭接點 43"/>
-          <p:cNvCxnSpPr>
-            <a:stCxn id="15" idx="1"/>
-            <a:endCxn id="8" idx="3"/>
-          </p:cNvCxnSpPr>
-          <p:nvPr/>
-        </p:nvCxnSpPr>
-        <p:spPr>
-          <a:xfrm flipH="1" flipV="1">
-            <a:off x="5930537" y="3841831"/>
-            <a:ext cx="744582" cy="50524"/>
-          </a:xfrm>
-          <a:prstGeom prst="straightConnector1">
-            <a:avLst/>
-          </a:prstGeom>
-          <a:ln>
-            <a:tailEnd type="triangle"/>
-          </a:ln>
-        </p:spPr>
-        <p:style>
-          <a:lnRef idx="1">
-            <a:schemeClr val="accent1"/>
-          </a:lnRef>
-          <a:fillRef idx="0">
-            <a:schemeClr val="accent1"/>
-          </a:fillRef>
-          <a:effectRef idx="0">
-            <a:schemeClr val="accent1"/>
-          </a:effectRef>
-          <a:fontRef idx="minor">
-            <a:schemeClr val="tx1"/>
-          </a:fontRef>
-        </p:style>
-      </p:cxnSp>
-      <p:cxnSp>
-        <p:nvCxnSpPr>
           <p:cNvPr id="47" name="肘形接點 46"/>
           <p:cNvCxnSpPr>
             <a:stCxn id="14" idx="3"/>
@@ -7535,6 +7503,101 @@
           </a:p>
         </p:txBody>
       </p:sp>
+      <p:cxnSp>
+        <p:nvCxnSpPr>
+          <p:cNvPr id="39" name="直線接點 38"/>
+          <p:cNvCxnSpPr>
+            <a:stCxn id="15" idx="1"/>
+          </p:cNvCxnSpPr>
+          <p:nvPr/>
+        </p:nvCxnSpPr>
+        <p:spPr>
+          <a:xfrm flipH="1" flipV="1">
+            <a:off x="6449783" y="3892353"/>
+            <a:ext cx="225336" cy="2"/>
+          </a:xfrm>
+          <a:prstGeom prst="line">
+            <a:avLst/>
+          </a:prstGeom>
+        </p:spPr>
+        <p:style>
+          <a:lnRef idx="1">
+            <a:schemeClr val="accent1"/>
+          </a:lnRef>
+          <a:fillRef idx="0">
+            <a:schemeClr val="accent1"/>
+          </a:fillRef>
+          <a:effectRef idx="0">
+            <a:schemeClr val="accent1"/>
+          </a:effectRef>
+          <a:fontRef idx="minor">
+            <a:schemeClr val="tx1"/>
+          </a:fontRef>
+        </p:style>
+      </p:cxnSp>
+      <p:cxnSp>
+        <p:nvCxnSpPr>
+          <p:cNvPr id="48" name="直線接點 47"/>
+          <p:cNvCxnSpPr/>
+          <p:nvPr/>
+        </p:nvCxnSpPr>
+        <p:spPr>
+          <a:xfrm flipV="1">
+            <a:off x="6449783" y="2208362"/>
+            <a:ext cx="0" cy="1683991"/>
+          </a:xfrm>
+          <a:prstGeom prst="line">
+            <a:avLst/>
+          </a:prstGeom>
+        </p:spPr>
+        <p:style>
+          <a:lnRef idx="1">
+            <a:schemeClr val="accent1"/>
+          </a:lnRef>
+          <a:fillRef idx="0">
+            <a:schemeClr val="accent1"/>
+          </a:fillRef>
+          <a:effectRef idx="0">
+            <a:schemeClr val="accent1"/>
+          </a:effectRef>
+          <a:fontRef idx="minor">
+            <a:schemeClr val="tx1"/>
+          </a:fontRef>
+        </p:style>
+      </p:cxnSp>
+      <p:cxnSp>
+        <p:nvCxnSpPr>
+          <p:cNvPr id="60" name="直線單箭頭接點 59"/>
+          <p:cNvCxnSpPr/>
+          <p:nvPr/>
+        </p:nvCxnSpPr>
+        <p:spPr>
+          <a:xfrm flipH="1">
+            <a:off x="5016136" y="2208362"/>
+            <a:ext cx="1433647" cy="0"/>
+          </a:xfrm>
+          <a:prstGeom prst="straightConnector1">
+            <a:avLst/>
+          </a:prstGeom>
+          <a:ln>
+            <a:tailEnd type="triangle"/>
+          </a:ln>
+        </p:spPr>
+        <p:style>
+          <a:lnRef idx="1">
+            <a:schemeClr val="accent1"/>
+          </a:lnRef>
+          <a:fillRef idx="0">
+            <a:schemeClr val="accent1"/>
+          </a:fillRef>
+          <a:effectRef idx="0">
+            <a:schemeClr val="accent1"/>
+          </a:effectRef>
+          <a:fontRef idx="minor">
+            <a:schemeClr val="tx1"/>
+          </a:fontRef>
+        </p:style>
+      </p:cxnSp>
     </p:spTree>
     <p:extLst>
       <p:ext uri="{BB962C8B-B14F-4D97-AF65-F5344CB8AC3E}">

</xml_diff>